<commit_message>
added examples to presentation
</commit_message>
<xml_diff>
--- a/PL-Final-Project.pptx
+++ b/PL-Final-Project.pptx
@@ -110,6 +110,11 @@
       </a:defRPr>
     </a:lvl9pPr>
   </p:defaultTextStyle>
+  <p:extLst>
+    <p:ext uri="{EFAFB233-063F-42B5-8137-9DF3F51BA10A}">
+      <p15:sldGuideLst xmlns:p15="http://schemas.microsoft.com/office/powerpoint/2012/main"/>
+    </p:ext>
+  </p:extLst>
 </p:presentation>
 </file>
 
@@ -243,7 +248,7 @@
           </a:lstStyle>
           <a:p>
             <a:r>
-              <a:rPr lang="en-US" smtClean="0"/>
+              <a:rPr lang="en-US"/>
               <a:t>Click to edit Master title style</a:t>
             </a:r>
             <a:endParaRPr lang="en-US" dirty="0"/>
@@ -315,7 +320,7 @@
           </a:lstStyle>
           <a:p>
             <a:r>
-              <a:rPr lang="en-US" smtClean="0"/>
+              <a:rPr lang="en-US"/>
               <a:t>Click to edit Master subtitle style</a:t>
             </a:r>
             <a:endParaRPr lang="en-US" dirty="0"/>
@@ -471,7 +476,7 @@
           <a:lstStyle/>
           <a:p>
             <a:r>
-              <a:rPr lang="en-US" smtClean="0"/>
+              <a:rPr lang="en-US"/>
               <a:t>Click to edit Master title style</a:t>
             </a:r>
             <a:endParaRPr lang="en-US" dirty="0"/>
@@ -495,35 +500,35 @@
           <a:p>
             <a:pPr lvl="0"/>
             <a:r>
-              <a:rPr lang="en-US" smtClean="0"/>
+              <a:rPr lang="en-US"/>
               <a:t>Click to edit Master text styles</a:t>
             </a:r>
           </a:p>
           <a:p>
             <a:pPr lvl="1"/>
             <a:r>
-              <a:rPr lang="en-US" smtClean="0"/>
+              <a:rPr lang="en-US"/>
               <a:t>Second level</a:t>
             </a:r>
           </a:p>
           <a:p>
             <a:pPr lvl="2"/>
             <a:r>
-              <a:rPr lang="en-US" smtClean="0"/>
+              <a:rPr lang="en-US"/>
               <a:t>Third level</a:t>
             </a:r>
           </a:p>
           <a:p>
             <a:pPr lvl="3"/>
             <a:r>
-              <a:rPr lang="en-US" smtClean="0"/>
+              <a:rPr lang="en-US"/>
               <a:t>Fourth level</a:t>
             </a:r>
           </a:p>
           <a:p>
             <a:pPr lvl="4"/>
             <a:r>
-              <a:rPr lang="en-US" smtClean="0"/>
+              <a:rPr lang="en-US"/>
               <a:t>Fifth level</a:t>
             </a:r>
             <a:endParaRPr lang="en-US" dirty="0"/>
@@ -722,7 +727,7 @@
           <a:lstStyle/>
           <a:p>
             <a:r>
-              <a:rPr lang="en-US" smtClean="0"/>
+              <a:rPr lang="en-US"/>
               <a:t>Click to edit Master title style</a:t>
             </a:r>
             <a:endParaRPr lang="en-US" dirty="0"/>
@@ -751,35 +756,35 @@
           <a:p>
             <a:pPr lvl="0"/>
             <a:r>
-              <a:rPr lang="en-US" smtClean="0"/>
+              <a:rPr lang="en-US"/>
               <a:t>Click to edit Master text styles</a:t>
             </a:r>
           </a:p>
           <a:p>
             <a:pPr lvl="1"/>
             <a:r>
-              <a:rPr lang="en-US" smtClean="0"/>
+              <a:rPr lang="en-US"/>
               <a:t>Second level</a:t>
             </a:r>
           </a:p>
           <a:p>
             <a:pPr lvl="2"/>
             <a:r>
-              <a:rPr lang="en-US" smtClean="0"/>
+              <a:rPr lang="en-US"/>
               <a:t>Third level</a:t>
             </a:r>
           </a:p>
           <a:p>
             <a:pPr lvl="3"/>
             <a:r>
-              <a:rPr lang="en-US" smtClean="0"/>
+              <a:rPr lang="en-US"/>
               <a:t>Fourth level</a:t>
             </a:r>
           </a:p>
           <a:p>
             <a:pPr lvl="4"/>
             <a:r>
-              <a:rPr lang="en-US" smtClean="0"/>
+              <a:rPr lang="en-US"/>
               <a:t>Fifth level</a:t>
             </a:r>
             <a:endParaRPr lang="en-US" dirty="0"/>
@@ -901,7 +906,7 @@
           </a:lstStyle>
           <a:p>
             <a:r>
-              <a:rPr lang="en-US" smtClean="0"/>
+              <a:rPr lang="en-US"/>
               <a:t>Click to edit Master title style</a:t>
             </a:r>
             <a:endParaRPr lang="en-US" dirty="0"/>
@@ -925,35 +930,35 @@
           <a:p>
             <a:pPr lvl="0"/>
             <a:r>
-              <a:rPr lang="en-US" smtClean="0"/>
+              <a:rPr lang="en-US"/>
               <a:t>Click to edit Master text styles</a:t>
             </a:r>
           </a:p>
           <a:p>
             <a:pPr lvl="1"/>
             <a:r>
-              <a:rPr lang="en-US" smtClean="0"/>
+              <a:rPr lang="en-US"/>
               <a:t>Second level</a:t>
             </a:r>
           </a:p>
           <a:p>
             <a:pPr lvl="2"/>
             <a:r>
-              <a:rPr lang="en-US" smtClean="0"/>
+              <a:rPr lang="en-US"/>
               <a:t>Third level</a:t>
             </a:r>
           </a:p>
           <a:p>
             <a:pPr lvl="3"/>
             <a:r>
-              <a:rPr lang="en-US" smtClean="0"/>
+              <a:rPr lang="en-US"/>
               <a:t>Fourth level</a:t>
             </a:r>
           </a:p>
           <a:p>
             <a:pPr lvl="4"/>
             <a:r>
-              <a:rPr lang="en-US" smtClean="0"/>
+              <a:rPr lang="en-US"/>
               <a:t>Fifth level</a:t>
             </a:r>
             <a:endParaRPr lang="en-US" dirty="0"/>
@@ -1176,7 +1181,7 @@
           </a:lstStyle>
           <a:p>
             <a:r>
-              <a:rPr lang="en-US" smtClean="0"/>
+              <a:rPr lang="en-US"/>
               <a:t>Click to edit Master title style</a:t>
             </a:r>
             <a:endParaRPr lang="en-US" dirty="0"/>
@@ -1297,7 +1302,7 @@
           <a:p>
             <a:pPr lvl="0"/>
             <a:r>
-              <a:rPr lang="en-US" smtClean="0"/>
+              <a:rPr lang="en-US"/>
               <a:t>Click to edit Master text styles</a:t>
             </a:r>
           </a:p>
@@ -1457,7 +1462,7 @@
           <a:lstStyle/>
           <a:p>
             <a:r>
-              <a:rPr lang="en-US" smtClean="0"/>
+              <a:rPr lang="en-US"/>
               <a:t>Click to edit Master title style</a:t>
             </a:r>
             <a:endParaRPr lang="en-US" dirty="0"/>
@@ -1486,35 +1491,35 @@
           <a:p>
             <a:pPr lvl="0"/>
             <a:r>
-              <a:rPr lang="en-US" smtClean="0"/>
+              <a:rPr lang="en-US"/>
               <a:t>Click to edit Master text styles</a:t>
             </a:r>
           </a:p>
           <a:p>
             <a:pPr lvl="1"/>
             <a:r>
-              <a:rPr lang="en-US" smtClean="0"/>
+              <a:rPr lang="en-US"/>
               <a:t>Second level</a:t>
             </a:r>
           </a:p>
           <a:p>
             <a:pPr lvl="2"/>
             <a:r>
-              <a:rPr lang="en-US" smtClean="0"/>
+              <a:rPr lang="en-US"/>
               <a:t>Third level</a:t>
             </a:r>
           </a:p>
           <a:p>
             <a:pPr lvl="3"/>
             <a:r>
-              <a:rPr lang="en-US" smtClean="0"/>
+              <a:rPr lang="en-US"/>
               <a:t>Fourth level</a:t>
             </a:r>
           </a:p>
           <a:p>
             <a:pPr lvl="4"/>
             <a:r>
-              <a:rPr lang="en-US" smtClean="0"/>
+              <a:rPr lang="en-US"/>
               <a:t>Fifth level</a:t>
             </a:r>
             <a:endParaRPr lang="en-US" dirty="0"/>
@@ -1543,35 +1548,35 @@
           <a:p>
             <a:pPr lvl="0"/>
             <a:r>
-              <a:rPr lang="en-US" smtClean="0"/>
+              <a:rPr lang="en-US"/>
               <a:t>Click to edit Master text styles</a:t>
             </a:r>
           </a:p>
           <a:p>
             <a:pPr lvl="1"/>
             <a:r>
-              <a:rPr lang="en-US" smtClean="0"/>
+              <a:rPr lang="en-US"/>
               <a:t>Second level</a:t>
             </a:r>
           </a:p>
           <a:p>
             <a:pPr lvl="2"/>
             <a:r>
-              <a:rPr lang="en-US" smtClean="0"/>
+              <a:rPr lang="en-US"/>
               <a:t>Third level</a:t>
             </a:r>
           </a:p>
           <a:p>
             <a:pPr lvl="3"/>
             <a:r>
-              <a:rPr lang="en-US" smtClean="0"/>
+              <a:rPr lang="en-US"/>
               <a:t>Fourth level</a:t>
             </a:r>
           </a:p>
           <a:p>
             <a:pPr lvl="4"/>
             <a:r>
-              <a:rPr lang="en-US" smtClean="0"/>
+              <a:rPr lang="en-US"/>
               <a:t>Fifth level</a:t>
             </a:r>
             <a:endParaRPr lang="en-US" dirty="0"/>
@@ -1694,7 +1699,7 @@
           <a:lstStyle/>
           <a:p>
             <a:r>
-              <a:rPr lang="en-US" smtClean="0"/>
+              <a:rPr lang="en-US"/>
               <a:t>Click to edit Master title style</a:t>
             </a:r>
             <a:endParaRPr lang="en-US" dirty="0"/>
@@ -1766,7 +1771,7 @@
           <a:p>
             <a:pPr lvl="0"/>
             <a:r>
-              <a:rPr lang="en-US" smtClean="0"/>
+              <a:rPr lang="en-US"/>
               <a:t>Click to edit Master text styles</a:t>
             </a:r>
           </a:p>
@@ -1794,35 +1799,35 @@
           <a:p>
             <a:pPr lvl="0"/>
             <a:r>
-              <a:rPr lang="en-US" smtClean="0"/>
+              <a:rPr lang="en-US"/>
               <a:t>Click to edit Master text styles</a:t>
             </a:r>
           </a:p>
           <a:p>
             <a:pPr lvl="1"/>
             <a:r>
-              <a:rPr lang="en-US" smtClean="0"/>
+              <a:rPr lang="en-US"/>
               <a:t>Second level</a:t>
             </a:r>
           </a:p>
           <a:p>
             <a:pPr lvl="2"/>
             <a:r>
-              <a:rPr lang="en-US" smtClean="0"/>
+              <a:rPr lang="en-US"/>
               <a:t>Third level</a:t>
             </a:r>
           </a:p>
           <a:p>
             <a:pPr lvl="3"/>
             <a:r>
-              <a:rPr lang="en-US" smtClean="0"/>
+              <a:rPr lang="en-US"/>
               <a:t>Fourth level</a:t>
             </a:r>
           </a:p>
           <a:p>
             <a:pPr lvl="4"/>
             <a:r>
-              <a:rPr lang="en-US" smtClean="0"/>
+              <a:rPr lang="en-US"/>
               <a:t>Fifth level</a:t>
             </a:r>
             <a:endParaRPr lang="en-US" dirty="0"/>
@@ -1894,7 +1899,7 @@
           <a:p>
             <a:pPr lvl="0"/>
             <a:r>
-              <a:rPr lang="en-US" smtClean="0"/>
+              <a:rPr lang="en-US"/>
               <a:t>Click to edit Master text styles</a:t>
             </a:r>
           </a:p>
@@ -1922,35 +1927,35 @@
           <a:p>
             <a:pPr lvl="0"/>
             <a:r>
-              <a:rPr lang="en-US" smtClean="0"/>
+              <a:rPr lang="en-US"/>
               <a:t>Click to edit Master text styles</a:t>
             </a:r>
           </a:p>
           <a:p>
             <a:pPr lvl="1"/>
             <a:r>
-              <a:rPr lang="en-US" smtClean="0"/>
+              <a:rPr lang="en-US"/>
               <a:t>Second level</a:t>
             </a:r>
           </a:p>
           <a:p>
             <a:pPr lvl="2"/>
             <a:r>
-              <a:rPr lang="en-US" smtClean="0"/>
+              <a:rPr lang="en-US"/>
               <a:t>Third level</a:t>
             </a:r>
           </a:p>
           <a:p>
             <a:pPr lvl="3"/>
             <a:r>
-              <a:rPr lang="en-US" smtClean="0"/>
+              <a:rPr lang="en-US"/>
               <a:t>Fourth level</a:t>
             </a:r>
           </a:p>
           <a:p>
             <a:pPr lvl="4"/>
             <a:r>
-              <a:rPr lang="en-US" smtClean="0"/>
+              <a:rPr lang="en-US"/>
               <a:t>Fifth level</a:t>
             </a:r>
             <a:endParaRPr lang="en-US" dirty="0"/>
@@ -2068,7 +2073,7 @@
           <a:lstStyle/>
           <a:p>
             <a:r>
-              <a:rPr lang="en-US" smtClean="0"/>
+              <a:rPr lang="en-US"/>
               <a:t>Click to edit Master title style</a:t>
             </a:r>
             <a:endParaRPr lang="en-US" dirty="0"/>
@@ -2456,7 +2461,7 @@
           </a:lstStyle>
           <a:p>
             <a:r>
-              <a:rPr lang="en-US" smtClean="0"/>
+              <a:rPr lang="en-US"/>
               <a:t>Click to edit Master title style</a:t>
             </a:r>
             <a:endParaRPr lang="en-US" dirty="0"/>
@@ -2485,35 +2490,35 @@
           <a:p>
             <a:pPr lvl="0"/>
             <a:r>
-              <a:rPr lang="en-US" smtClean="0"/>
+              <a:rPr lang="en-US"/>
               <a:t>Click to edit Master text styles</a:t>
             </a:r>
           </a:p>
           <a:p>
             <a:pPr lvl="1"/>
             <a:r>
-              <a:rPr lang="en-US" smtClean="0"/>
+              <a:rPr lang="en-US"/>
               <a:t>Second level</a:t>
             </a:r>
           </a:p>
           <a:p>
             <a:pPr lvl="2"/>
             <a:r>
-              <a:rPr lang="en-US" smtClean="0"/>
+              <a:rPr lang="en-US"/>
               <a:t>Third level</a:t>
             </a:r>
           </a:p>
           <a:p>
             <a:pPr lvl="3"/>
             <a:r>
-              <a:rPr lang="en-US" smtClean="0"/>
+              <a:rPr lang="en-US"/>
               <a:t>Fourth level</a:t>
             </a:r>
           </a:p>
           <a:p>
             <a:pPr lvl="4"/>
             <a:r>
-              <a:rPr lang="en-US" smtClean="0"/>
+              <a:rPr lang="en-US"/>
               <a:t>Fifth level</a:t>
             </a:r>
             <a:endParaRPr lang="en-US" dirty="0"/>
@@ -2585,7 +2590,7 @@
           <a:p>
             <a:pPr lvl="0"/>
             <a:r>
-              <a:rPr lang="en-US" smtClean="0"/>
+              <a:rPr lang="en-US"/>
               <a:t>Click to edit Master text styles</a:t>
             </a:r>
           </a:p>
@@ -2823,7 +2828,7 @@
           </a:lstStyle>
           <a:p>
             <a:r>
-              <a:rPr lang="en-US" smtClean="0"/>
+              <a:rPr lang="en-US"/>
               <a:t>Click to edit Master title style</a:t>
             </a:r>
             <a:endParaRPr lang="en-US" dirty="0"/>
@@ -2898,7 +2903,7 @@
           </a:lstStyle>
           <a:p>
             <a:r>
-              <a:rPr lang="en-US" smtClean="0"/>
+              <a:rPr lang="en-US"/>
               <a:t>Click icon to add picture</a:t>
             </a:r>
             <a:endParaRPr lang="en-US" dirty="0"/>
@@ -2976,7 +2981,7 @@
           <a:p>
             <a:pPr lvl="0"/>
             <a:r>
-              <a:rPr lang="en-US" smtClean="0"/>
+              <a:rPr lang="en-US"/>
               <a:t>Click to edit Master text styles</a:t>
             </a:r>
           </a:p>
@@ -3184,7 +3189,7 @@
           <a:lstStyle/>
           <a:p>
             <a:r>
-              <a:rPr lang="en-US" smtClean="0"/>
+              <a:rPr lang="en-US"/>
               <a:t>Click to edit Master title style</a:t>
             </a:r>
             <a:endParaRPr lang="en-US" dirty="0"/>
@@ -3218,35 +3223,35 @@
           <a:p>
             <a:pPr lvl="0"/>
             <a:r>
-              <a:rPr lang="en-US" smtClean="0"/>
+              <a:rPr lang="en-US"/>
               <a:t>Click to edit Master text styles</a:t>
             </a:r>
           </a:p>
           <a:p>
             <a:pPr lvl="1"/>
             <a:r>
-              <a:rPr lang="en-US" smtClean="0"/>
+              <a:rPr lang="en-US"/>
               <a:t>Second level</a:t>
             </a:r>
           </a:p>
           <a:p>
             <a:pPr lvl="2"/>
             <a:r>
-              <a:rPr lang="en-US" smtClean="0"/>
+              <a:rPr lang="en-US"/>
               <a:t>Third level</a:t>
             </a:r>
           </a:p>
           <a:p>
             <a:pPr lvl="3"/>
             <a:r>
-              <a:rPr lang="en-US" smtClean="0"/>
+              <a:rPr lang="en-US"/>
               <a:t>Fourth level</a:t>
             </a:r>
           </a:p>
           <a:p>
             <a:pPr lvl="4"/>
             <a:r>
-              <a:rPr lang="en-US" smtClean="0"/>
+              <a:rPr lang="en-US"/>
               <a:t>Fifth level</a:t>
             </a:r>
             <a:endParaRPr lang="en-US" dirty="0"/>
@@ -3826,10 +3831,9 @@
           <a:lstStyle/>
           <a:p>
             <a:r>
-              <a:rPr lang="en-US" dirty="0" smtClean="0"/>
+              <a:rPr lang="en-US" dirty="0"/>
               <a:t>PL Final Project</a:t>
             </a:r>
-            <a:endParaRPr lang="en-US" dirty="0"/>
           </a:p>
         </p:txBody>
       </p:sp>
@@ -3849,16 +3853,15 @@
           <a:lstStyle/>
           <a:p>
             <a:r>
-              <a:rPr lang="en-US" dirty="0" smtClean="0"/>
+              <a:rPr lang="en-US" dirty="0"/>
               <a:t>Richard Huynh</a:t>
             </a:r>
           </a:p>
           <a:p>
             <a:r>
-              <a:rPr lang="en-US" dirty="0" smtClean="0"/>
+              <a:rPr lang="en-US" dirty="0"/>
               <a:t>Eric Nam</a:t>
             </a:r>
-            <a:endParaRPr lang="en-US" dirty="0"/>
           </a:p>
         </p:txBody>
       </p:sp>
@@ -3908,10 +3911,9 @@
           <a:lstStyle/>
           <a:p>
             <a:r>
-              <a:rPr lang="en-US" dirty="0" smtClean="0"/>
+              <a:rPr lang="en-US" dirty="0"/>
               <a:t>Part One – Removing excess code</a:t>
             </a:r>
-            <a:endParaRPr lang="en-US" dirty="0"/>
           </a:p>
         </p:txBody>
       </p:sp>
@@ -3931,50 +3933,23 @@
           <a:lstStyle/>
           <a:p>
             <a:r>
-              <a:rPr lang="en-US" sz="2800" dirty="0" smtClean="0"/>
+              <a:rPr lang="en-US" sz="2800" dirty="0"/>
               <a:t>Remove all excess code from yacc.py and lis.py</a:t>
             </a:r>
           </a:p>
           <a:p>
             <a:pPr lvl="1"/>
             <a:r>
-              <a:rPr lang="en-US" sz="2400" dirty="0" smtClean="0"/>
+              <a:rPr lang="en-US" sz="2400" dirty="0"/>
               <a:t>Yacc.py – removed all functions with SIMB operators, and all </a:t>
             </a:r>
             <a:r>
-              <a:rPr lang="en-US" sz="2400" dirty="0" err="1" smtClean="0"/>
+              <a:rPr lang="en-US" sz="2400" dirty="0" err="1"/>
               <a:t>eval</a:t>
             </a:r>
             <a:r>
-              <a:rPr lang="en-US" sz="2400" dirty="0" smtClean="0"/>
+              <a:rPr lang="en-US" sz="2400" dirty="0"/>
               <a:t> functions</a:t>
-            </a:r>
-          </a:p>
-          <a:p>
-            <a:pPr lvl="1"/>
-            <a:endParaRPr lang="en-US" sz="2400" dirty="0" smtClean="0"/>
-          </a:p>
-          <a:p>
-            <a:pPr lvl="1"/>
-            <a:r>
-              <a:rPr lang="en-US" sz="2400" dirty="0" smtClean="0"/>
-              <a:t>Lis.py – removed parsing, tokenizing, </a:t>
-            </a:r>
-            <a:r>
-              <a:rPr lang="en-US" sz="2400" dirty="0" err="1" smtClean="0"/>
-              <a:t>read_from_token</a:t>
-            </a:r>
-            <a:r>
-              <a:rPr lang="en-US" sz="2400" dirty="0" smtClean="0"/>
-              <a:t> and atom functions as we use </a:t>
-            </a:r>
-            <a:r>
-              <a:rPr lang="en-US" sz="2400" dirty="0" err="1" smtClean="0"/>
-              <a:t>yacc</a:t>
-            </a:r>
-            <a:r>
-              <a:rPr lang="en-US" sz="2400" dirty="0" smtClean="0"/>
-              <a:t> as our parser</a:t>
             </a:r>
           </a:p>
           <a:p>
@@ -3983,11 +3958,38 @@
           </a:p>
           <a:p>
             <a:pPr lvl="1"/>
-            <a:endParaRPr lang="en-US" sz="2400" dirty="0" smtClean="0"/>
+            <a:r>
+              <a:rPr lang="en-US" sz="2400" dirty="0"/>
+              <a:t>Lis.py – removed parsing, tokenizing, </a:t>
+            </a:r>
+            <a:r>
+              <a:rPr lang="en-US" sz="2400" dirty="0" err="1"/>
+              <a:t>read_from_token</a:t>
+            </a:r>
+            <a:r>
+              <a:rPr lang="en-US" sz="2400" dirty="0"/>
+              <a:t> and atom functions as we use </a:t>
+            </a:r>
+            <a:r>
+              <a:rPr lang="en-US" sz="2400" dirty="0" err="1"/>
+              <a:t>yacc</a:t>
+            </a:r>
+            <a:r>
+              <a:rPr lang="en-US" sz="2400" dirty="0"/>
+              <a:t> as our parser</a:t>
+            </a:r>
           </a:p>
           <a:p>
             <a:pPr lvl="1"/>
-            <a:endParaRPr lang="en-US" sz="2400" dirty="0" smtClean="0"/>
+            <a:endParaRPr lang="en-US" sz="2400" dirty="0"/>
+          </a:p>
+          <a:p>
+            <a:pPr lvl="1"/>
+            <a:endParaRPr lang="en-US" sz="2400" dirty="0"/>
+          </a:p>
+          <a:p>
+            <a:pPr lvl="1"/>
+            <a:endParaRPr lang="en-US" sz="2400" dirty="0"/>
           </a:p>
           <a:p>
             <a:pPr lvl="1"/>
@@ -4044,10 +4046,9 @@
           <a:lstStyle/>
           <a:p>
             <a:r>
-              <a:rPr lang="en-US" dirty="0" smtClean="0"/>
+              <a:rPr lang="en-US" dirty="0"/>
               <a:t>Part Three – Closures	</a:t>
             </a:r>
-            <a:endParaRPr lang="en-US" dirty="0"/>
           </a:p>
         </p:txBody>
       </p:sp>
@@ -4063,52 +4064,54 @@
         </p:nvSpPr>
         <p:spPr/>
         <p:txBody>
-          <a:bodyPr/>
-          <a:lstStyle/>
-          <a:p>
-            <a:r>
-              <a:rPr lang="en-US" sz="2800" dirty="0" smtClean="0"/>
+          <a:bodyPr>
+            <a:normAutofit fontScale="85000" lnSpcReduction="20000"/>
+          </a:bodyPr>
+          <a:lstStyle/>
+          <a:p>
+            <a:r>
+              <a:rPr lang="en-US" sz="2800" dirty="0"/>
               <a:t>PartThree.py</a:t>
             </a:r>
           </a:p>
           <a:p>
             <a:pPr lvl="1"/>
             <a:r>
-              <a:rPr lang="en-US" sz="2400" dirty="0" smtClean="0"/>
+              <a:rPr lang="en-US" sz="2400" dirty="0"/>
               <a:t>Dictionary of a car</a:t>
             </a:r>
           </a:p>
           <a:p>
             <a:pPr lvl="2"/>
             <a:r>
-              <a:rPr lang="en-US" sz="2000" dirty="0" err="1" smtClean="0"/>
+              <a:rPr lang="en-US" sz="2000" dirty="0" err="1"/>
               <a:t>getBrand</a:t>
             </a:r>
             <a:r>
-              <a:rPr lang="en-US" sz="2000" dirty="0" smtClean="0"/>
+              <a:rPr lang="en-US" sz="2000" dirty="0"/>
               <a:t>, </a:t>
             </a:r>
             <a:r>
-              <a:rPr lang="en-US" sz="2000" dirty="0" err="1" smtClean="0"/>
+              <a:rPr lang="en-US" sz="2000" dirty="0" err="1"/>
               <a:t>setBrand</a:t>
             </a:r>
             <a:r>
-              <a:rPr lang="en-US" sz="2000" dirty="0" smtClean="0"/>
+              <a:rPr lang="en-US" sz="2000" dirty="0"/>
               <a:t>, </a:t>
             </a:r>
             <a:r>
-              <a:rPr lang="en-US" sz="2000" dirty="0" err="1" smtClean="0"/>
+              <a:rPr lang="en-US" sz="2000" dirty="0" err="1"/>
               <a:t>getModel</a:t>
             </a:r>
             <a:r>
-              <a:rPr lang="en-US" sz="2000" dirty="0" smtClean="0"/>
+              <a:rPr lang="en-US" sz="2000" dirty="0"/>
               <a:t>, </a:t>
             </a:r>
             <a:r>
-              <a:rPr lang="en-US" sz="2000" dirty="0" err="1" smtClean="0"/>
+              <a:rPr lang="en-US" sz="2000" dirty="0" err="1"/>
               <a:t>setModel</a:t>
             </a:r>
-            <a:endParaRPr lang="en-US" sz="2000" dirty="0" smtClean="0"/>
+            <a:endParaRPr lang="en-US" sz="2000" dirty="0"/>
           </a:p>
           <a:p>
             <a:pPr lvl="2"/>
@@ -4117,35 +4120,35 @@
           <a:p>
             <a:pPr lvl="1"/>
             <a:r>
-              <a:rPr lang="en-US" sz="2400" dirty="0" smtClean="0"/>
+              <a:rPr lang="en-US" sz="2400" dirty="0"/>
               <a:t> </a:t>
             </a:r>
             <a:r>
-              <a:rPr lang="en-US" sz="2400" dirty="0" err="1" smtClean="0"/>
+              <a:rPr lang="en-US" sz="2400" dirty="0" err="1"/>
               <a:t>setBrand</a:t>
             </a:r>
-            <a:endParaRPr lang="en-US" sz="1400" dirty="0" smtClean="0"/>
+            <a:endParaRPr lang="en-US" sz="1400" dirty="0"/>
           </a:p>
           <a:p>
             <a:pPr lvl="2"/>
             <a:r>
-              <a:rPr lang="en-US" sz="2000" dirty="0" smtClean="0"/>
+              <a:rPr lang="en-US" sz="2000" dirty="0"/>
               <a:t>‘</a:t>
             </a:r>
             <a:r>
-              <a:rPr lang="en-US" sz="2000" dirty="0" err="1" smtClean="0"/>
+              <a:rPr lang="en-US" sz="2000" dirty="0" err="1"/>
               <a:t>setBrand</a:t>
             </a:r>
             <a:r>
-              <a:rPr lang="en-US" sz="2000" dirty="0" smtClean="0"/>
+              <a:rPr lang="en-US" sz="2000" dirty="0"/>
               <a:t>’ updates ‘</a:t>
             </a:r>
             <a:r>
-              <a:rPr lang="en-US" sz="2000" dirty="0" err="1" smtClean="0"/>
+              <a:rPr lang="en-US" sz="2000" dirty="0" err="1"/>
               <a:t>getBrand</a:t>
             </a:r>
             <a:r>
-              <a:rPr lang="en-US" sz="2000" dirty="0" smtClean="0"/>
+              <a:rPr lang="en-US" sz="2000" dirty="0"/>
               <a:t>’ with user’s new input</a:t>
             </a:r>
           </a:p>
@@ -4156,32 +4159,88 @@
           <a:p>
             <a:pPr lvl="1"/>
             <a:r>
-              <a:rPr lang="en-US" sz="2400" dirty="0" err="1" smtClean="0"/>
+              <a:rPr lang="en-US" sz="2400" dirty="0" err="1"/>
               <a:t>setModel</a:t>
             </a:r>
-            <a:endParaRPr lang="en-US" sz="2400" dirty="0" smtClean="0"/>
+            <a:endParaRPr lang="en-US" sz="2400" dirty="0"/>
           </a:p>
           <a:p>
             <a:pPr lvl="2"/>
             <a:r>
-              <a:rPr lang="en-US" sz="2000" dirty="0" smtClean="0"/>
+              <a:rPr lang="en-US" sz="2000" dirty="0"/>
               <a:t>‘</a:t>
             </a:r>
             <a:r>
-              <a:rPr lang="en-US" sz="2000" dirty="0" err="1" smtClean="0"/>
+              <a:rPr lang="en-US" sz="2000" dirty="0" err="1"/>
               <a:t>setModel</a:t>
             </a:r>
             <a:r>
-              <a:rPr lang="en-US" sz="2000" dirty="0" smtClean="0"/>
+              <a:rPr lang="en-US" sz="2000" dirty="0"/>
               <a:t>’ updates ‘</a:t>
             </a:r>
             <a:r>
-              <a:rPr lang="en-US" sz="2000" dirty="0" err="1" smtClean="0"/>
+              <a:rPr lang="en-US" sz="2000" dirty="0" err="1"/>
               <a:t>getModel</a:t>
             </a:r>
             <a:r>
-              <a:rPr lang="en-US" sz="2000" dirty="0" smtClean="0"/>
+              <a:rPr lang="en-US" sz="2000" dirty="0"/>
               <a:t>’ with user’s new input</a:t>
+            </a:r>
+          </a:p>
+          <a:p>
+            <a:pPr lvl="2"/>
+            <a:endParaRPr lang="en-US" sz="2000" dirty="0"/>
+          </a:p>
+          <a:p>
+            <a:pPr lvl="1"/>
+            <a:r>
+              <a:rPr lang="en-US" sz="2400" dirty="0"/>
+              <a:t>Ex. (define a ‘cars()’)</a:t>
+            </a:r>
+          </a:p>
+          <a:p>
+            <a:pPr lvl="4"/>
+            <a:r>
+              <a:rPr lang="en-US" sz="2000" dirty="0"/>
+              <a:t>(run a ‘(</a:t>
+            </a:r>
+            <a:r>
+              <a:rPr lang="en-US" sz="2000" dirty="0" err="1"/>
+              <a:t>getBrand</a:t>
+            </a:r>
+            <a:r>
+              <a:rPr lang="en-US" sz="2000" dirty="0"/>
+              <a:t>))</a:t>
+            </a:r>
+          </a:p>
+          <a:p>
+            <a:pPr lvl="4"/>
+            <a:r>
+              <a:rPr lang="en-US" sz="2000" dirty="0"/>
+              <a:t>(run a ‘(</a:t>
+            </a:r>
+            <a:r>
+              <a:rPr lang="en-US" sz="2000" dirty="0" err="1"/>
+              <a:t>setBrand</a:t>
+            </a:r>
+            <a:r>
+              <a:rPr lang="en-US" sz="2000" dirty="0"/>
+              <a:t> Honda))</a:t>
+            </a:r>
+          </a:p>
+          <a:p>
+            <a:pPr lvl="4"/>
+            <a:r>
+              <a:rPr lang="en-US" sz="2000" dirty="0"/>
+              <a:t>(run a ‘(</a:t>
+            </a:r>
+            <a:r>
+              <a:rPr lang="en-US" sz="2000" dirty="0" err="1"/>
+              <a:t>getBrand</a:t>
+            </a:r>
+            <a:r>
+              <a:rPr lang="en-US" sz="2000" dirty="0"/>
+              <a:t>))</a:t>
             </a:r>
           </a:p>
         </p:txBody>
@@ -4232,10 +4291,9 @@
           <a:lstStyle/>
           <a:p>
             <a:r>
-              <a:rPr lang="en-US" dirty="0" smtClean="0"/>
+              <a:rPr lang="en-US" dirty="0"/>
               <a:t>Part Four – Stream Operations</a:t>
             </a:r>
-            <a:endParaRPr lang="en-US" dirty="0"/>
           </a:p>
         </p:txBody>
       </p:sp>
@@ -4252,105 +4310,134 @@
         <p:spPr/>
         <p:txBody>
           <a:bodyPr>
-            <a:normAutofit/>
+            <a:normAutofit lnSpcReduction="10000"/>
           </a:bodyPr>
           <a:lstStyle/>
           <a:p>
             <a:r>
-              <a:rPr lang="en-US" sz="2800" dirty="0" smtClean="0"/>
+              <a:rPr lang="en-US" sz="2800" dirty="0"/>
               <a:t>PartFour.java</a:t>
             </a:r>
           </a:p>
           <a:p>
             <a:pPr lvl="1"/>
             <a:r>
-              <a:rPr lang="en-US" sz="2400" dirty="0" smtClean="0"/>
+              <a:rPr lang="en-US" sz="2400" dirty="0"/>
               <a:t>User inputs one or more employee information</a:t>
             </a:r>
           </a:p>
           <a:p>
             <a:pPr lvl="2"/>
             <a:r>
-              <a:rPr lang="en-US" sz="1800" dirty="0" smtClean="0"/>
+              <a:rPr lang="en-US" sz="1800" dirty="0"/>
               <a:t>[</a:t>
             </a:r>
             <a:r>
-              <a:rPr lang="en-US" sz="1800" dirty="0" err="1" smtClean="0"/>
+              <a:rPr lang="en-US" sz="1800" dirty="0" err="1"/>
               <a:t>Last_Name</a:t>
             </a:r>
             <a:r>
-              <a:rPr lang="en-US" sz="1800" dirty="0" smtClean="0"/>
+              <a:rPr lang="en-US" sz="1800" dirty="0"/>
               <a:t>, </a:t>
             </a:r>
             <a:r>
-              <a:rPr lang="en-US" sz="1800" dirty="0" err="1" smtClean="0"/>
+              <a:rPr lang="en-US" sz="1800" dirty="0" err="1"/>
               <a:t>First_Name</a:t>
             </a:r>
             <a:r>
-              <a:rPr lang="en-US" sz="1800" dirty="0" smtClean="0"/>
+              <a:rPr lang="en-US" sz="1800" dirty="0"/>
               <a:t>, Salary, Position]</a:t>
             </a:r>
           </a:p>
           <a:p>
             <a:pPr lvl="1"/>
             <a:r>
-              <a:rPr lang="en-US" sz="2400" dirty="0" smtClean="0"/>
+              <a:rPr lang="en-US" sz="2400" dirty="0"/>
               <a:t>Filter</a:t>
             </a:r>
           </a:p>
           <a:p>
             <a:pPr lvl="2"/>
             <a:r>
-              <a:rPr lang="en-US" sz="1800" dirty="0" smtClean="0"/>
+              <a:rPr lang="en-US" sz="1800" dirty="0"/>
               <a:t>Filters employees by Salary &gt; 1200</a:t>
             </a:r>
           </a:p>
           <a:p>
             <a:pPr lvl="1"/>
             <a:r>
-              <a:rPr lang="en-US" sz="2400" dirty="0" smtClean="0"/>
+              <a:rPr lang="en-US" sz="2400" dirty="0"/>
               <a:t>Map</a:t>
             </a:r>
           </a:p>
           <a:p>
             <a:pPr lvl="2"/>
             <a:r>
-              <a:rPr lang="en-US" sz="1800" dirty="0" smtClean="0"/>
+              <a:rPr lang="en-US" sz="1800" dirty="0"/>
               <a:t>Obtains only </a:t>
             </a:r>
             <a:r>
-              <a:rPr lang="en-US" sz="1800" dirty="0" err="1" smtClean="0"/>
+              <a:rPr lang="en-US" sz="1800" dirty="0" err="1"/>
               <a:t>Last_Name</a:t>
             </a:r>
             <a:r>
-              <a:rPr lang="en-US" sz="1800" dirty="0" smtClean="0"/>
+              <a:rPr lang="en-US" sz="1800" dirty="0"/>
               <a:t> and Salary of each employee</a:t>
             </a:r>
+          </a:p>
+          <a:p>
+            <a:pPr lvl="1"/>
+            <a:r>
+              <a:rPr lang="en-US" sz="2400" dirty="0" err="1"/>
+              <a:t>forEach</a:t>
+            </a:r>
+            <a:endParaRPr lang="en-US" sz="2400" dirty="0"/>
+          </a:p>
+          <a:p>
+            <a:pPr lvl="2"/>
+            <a:r>
+              <a:rPr lang="en-US" sz="1800" dirty="0"/>
+              <a:t>Loop through each employee and send to </a:t>
+            </a:r>
+            <a:r>
+              <a:rPr lang="en-US" sz="1800" dirty="0" err="1"/>
+              <a:t>yacc</a:t>
+            </a:r>
             <a:endParaRPr lang="en-US" sz="1800" dirty="0"/>
           </a:p>
           <a:p>
+            <a:pPr lvl="2"/>
+            <a:endParaRPr lang="en-US" sz="1800" dirty="0"/>
+          </a:p>
+          <a:p>
             <a:pPr lvl="1"/>
             <a:r>
-              <a:rPr lang="en-US" sz="2400" dirty="0" err="1"/>
-              <a:t>f</a:t>
-            </a:r>
-            <a:r>
-              <a:rPr lang="en-US" sz="2400" dirty="0" err="1" smtClean="0"/>
-              <a:t>orEach</a:t>
-            </a:r>
-            <a:endParaRPr lang="en-US" sz="2400" dirty="0" smtClean="0"/>
-          </a:p>
-          <a:p>
-            <a:pPr lvl="2"/>
-            <a:r>
-              <a:rPr lang="en-US" sz="1800" dirty="0" smtClean="0"/>
-              <a:t>Loop through each employee and send to </a:t>
-            </a:r>
-            <a:r>
-              <a:rPr lang="en-US" sz="1800" dirty="0" err="1" smtClean="0"/>
-              <a:t>yacc</a:t>
-            </a:r>
-            <a:endParaRPr lang="en-US" sz="1800" dirty="0" smtClean="0"/>
+              <a:rPr lang="en-US" sz="2200" dirty="0"/>
+              <a:t>Ex. (define so (exec ‘import </a:t>
+            </a:r>
+            <a:r>
+              <a:rPr lang="en-US" sz="2200" dirty="0" err="1"/>
+              <a:t>PartFour</a:t>
+            </a:r>
+            <a:r>
+              <a:rPr lang="en-US" sz="2200" dirty="0"/>
+              <a:t>; </a:t>
+            </a:r>
+            <a:r>
+              <a:rPr lang="en-US" sz="2200" dirty="0" err="1"/>
+              <a:t>PartFour.strop</a:t>
+            </a:r>
+            <a:r>
+              <a:rPr lang="en-US" sz="2200" dirty="0"/>
+              <a:t>()’))</a:t>
+            </a:r>
+          </a:p>
+          <a:p>
+            <a:pPr lvl="3"/>
+            <a:r>
+              <a:rPr lang="en-US" sz="1800" dirty="0"/>
+              <a:t>so</a:t>
+            </a:r>
           </a:p>
         </p:txBody>
       </p:sp>
@@ -4400,10 +4487,9 @@
           <a:lstStyle/>
           <a:p>
             <a:r>
-              <a:rPr lang="en-US" dirty="0" smtClean="0"/>
+              <a:rPr lang="en-US" dirty="0"/>
               <a:t>Part Five  - List Comprehensions</a:t>
             </a:r>
-            <a:endParaRPr lang="en-US" dirty="0"/>
           </a:p>
         </p:txBody>
       </p:sp>
@@ -4423,47 +4509,20 @@
           <a:lstStyle/>
           <a:p>
             <a:r>
-              <a:rPr lang="en-US" sz="2800" dirty="0" smtClean="0"/>
-              <a:t>Syntax: (</a:t>
-            </a:r>
-            <a:r>
-              <a:rPr lang="en-US" sz="2800" dirty="0" err="1" smtClean="0"/>
+              <a:rPr lang="en-US" sz="2800"/>
+              <a:t>Example Syntax</a:t>
+            </a:r>
+            <a:r>
+              <a:rPr lang="en-US" sz="2800" dirty="0"/>
+              <a:t>: (</a:t>
+            </a:r>
+            <a:r>
+              <a:rPr lang="en-US" sz="2800" dirty="0" err="1"/>
               <a:t>mapp</a:t>
             </a:r>
             <a:r>
-              <a:rPr lang="en-US" sz="2800" dirty="0" smtClean="0"/>
-              <a:t> ‘lambda x : x + 1 ‘ ‘(1 2 3))</a:t>
-            </a:r>
-          </a:p>
-          <a:p>
-            <a:pPr lvl="1"/>
-            <a:endParaRPr lang="en-US" sz="2400" dirty="0" smtClean="0"/>
-          </a:p>
-          <a:p>
-            <a:pPr lvl="1"/>
-            <a:r>
-              <a:rPr lang="en-US" sz="2400" dirty="0" smtClean="0"/>
-              <a:t>Addition of </a:t>
-            </a:r>
-            <a:r>
-              <a:rPr lang="en-US" sz="2400" dirty="0" err="1" smtClean="0"/>
-              <a:t>mapp</a:t>
-            </a:r>
-            <a:r>
-              <a:rPr lang="en-US" sz="2400" dirty="0" smtClean="0"/>
-              <a:t> to </a:t>
-            </a:r>
-            <a:r>
-              <a:rPr lang="en-US" sz="2400" dirty="0" err="1" smtClean="0"/>
-              <a:t>standard_env</a:t>
-            </a:r>
-            <a:endParaRPr lang="en-US" sz="2400" dirty="0"/>
-          </a:p>
-          <a:p>
-            <a:pPr lvl="2"/>
-            <a:r>
-              <a:rPr lang="en-US" sz="1800" dirty="0" smtClean="0"/>
-              <a:t>Line 73</a:t>
+              <a:rPr lang="en-US" sz="2800" dirty="0"/>
+              <a:t> ‘lambda x : x + 1‘ ‘(1 2 3))</a:t>
             </a:r>
           </a:p>
           <a:p>
@@ -4473,14 +4532,45 @@
           <a:p>
             <a:pPr lvl="1"/>
             <a:r>
-              <a:rPr lang="en-US" sz="2400" dirty="0" smtClean="0"/>
+              <a:rPr lang="en-US" sz="2400" dirty="0"/>
+              <a:t>Addition of </a:t>
+            </a:r>
+            <a:r>
+              <a:rPr lang="en-US" sz="2400" dirty="0" err="1"/>
+              <a:t>mapp</a:t>
+            </a:r>
+            <a:r>
+              <a:rPr lang="en-US" sz="2400" dirty="0"/>
+              <a:t> to </a:t>
+            </a:r>
+            <a:r>
+              <a:rPr lang="en-US" sz="2400" dirty="0" err="1"/>
+              <a:t>standard_env</a:t>
+            </a:r>
+            <a:endParaRPr lang="en-US" sz="2400" dirty="0"/>
+          </a:p>
+          <a:p>
+            <a:pPr lvl="2"/>
+            <a:r>
+              <a:rPr lang="en-US" sz="1800" dirty="0"/>
+              <a:t>Line 73</a:t>
+            </a:r>
+          </a:p>
+          <a:p>
+            <a:pPr lvl="1"/>
+            <a:endParaRPr lang="en-US" sz="2400" dirty="0"/>
+          </a:p>
+          <a:p>
+            <a:pPr lvl="1"/>
+            <a:r>
+              <a:rPr lang="en-US" sz="2400" dirty="0"/>
               <a:t>Configure lambda that is in text form to be able to be run</a:t>
             </a:r>
           </a:p>
           <a:p>
             <a:pPr lvl="2"/>
             <a:r>
-              <a:rPr lang="en-US" sz="1800" dirty="0" smtClean="0"/>
+              <a:rPr lang="en-US" sz="1800" dirty="0"/>
               <a:t>Line 133</a:t>
             </a:r>
           </a:p>
@@ -4540,10 +4630,9 @@
           <a:lstStyle/>
           <a:p>
             <a:r>
-              <a:rPr lang="en-US" dirty="0" smtClean="0"/>
+              <a:rPr lang="en-US" dirty="0"/>
               <a:t>Part Six – Bugs Fixed	</a:t>
             </a:r>
-            <a:endParaRPr lang="en-US" dirty="0"/>
           </a:p>
         </p:txBody>
       </p:sp>
@@ -4565,7 +4654,7 @@
           <a:lstStyle/>
           <a:p>
             <a:r>
-              <a:rPr lang="en-US" sz="2800" dirty="0" smtClean="0"/>
+              <a:rPr lang="en-US" sz="2800" dirty="0"/>
               <a:t>Fixed TEXT regex improperly reading lambda function</a:t>
             </a:r>
           </a:p>
@@ -4575,33 +4664,21 @@
             </a:pPr>
             <a:r>
               <a:rPr lang="en-US" sz="2800" dirty="0"/>
-              <a:t> </a:t>
-            </a:r>
-            <a:r>
-              <a:rPr lang="en-US" sz="2800" dirty="0" smtClean="0"/>
-              <a:t>  </a:t>
-            </a:r>
-            <a:r>
-              <a:rPr lang="en-US" sz="2600" dirty="0" smtClean="0"/>
+              <a:t>   </a:t>
+            </a:r>
+            <a:r>
+              <a:rPr lang="en-US" sz="2600" dirty="0"/>
               <a:t>Before</a:t>
             </a:r>
             <a:r>
-              <a:rPr lang="en-US" sz="2800" dirty="0" smtClean="0"/>
-              <a:t>					</a:t>
-            </a:r>
-            <a:r>
               <a:rPr lang="en-US" sz="2800" dirty="0"/>
-              <a:t> </a:t>
-            </a:r>
-            <a:r>
-              <a:rPr lang="en-US" sz="2800" dirty="0" smtClean="0"/>
-              <a:t> </a:t>
-            </a:r>
-            <a:r>
-              <a:rPr lang="en-US" sz="2600" dirty="0" smtClean="0"/>
+              <a:t>					  </a:t>
+            </a:r>
+            <a:r>
+              <a:rPr lang="en-US" sz="2600" dirty="0"/>
               <a:t>After</a:t>
             </a:r>
-            <a:endParaRPr lang="en-US" sz="2800" dirty="0" smtClean="0"/>
+            <a:endParaRPr lang="en-US" sz="2800" dirty="0"/>
           </a:p>
           <a:p>
             <a:pPr lvl="1"/>
@@ -4609,7 +4686,7 @@
           </a:p>
           <a:p>
             <a:pPr lvl="1"/>
-            <a:endParaRPr lang="en-US" sz="2400" dirty="0" smtClean="0"/>
+            <a:endParaRPr lang="en-US" sz="2400" dirty="0"/>
           </a:p>
           <a:p>
             <a:pPr lvl="1"/>
@@ -4617,25 +4694,25 @@
           </a:p>
           <a:p>
             <a:pPr lvl="1"/>
-            <a:endParaRPr lang="en-US" sz="2400" dirty="0" smtClean="0"/>
+            <a:endParaRPr lang="en-US" sz="2400" dirty="0"/>
           </a:p>
           <a:p>
             <a:pPr lvl="1"/>
             <a:endParaRPr lang="en-US" sz="2400" dirty="0"/>
           </a:p>
           <a:p>
-            <a:endParaRPr lang="en-US" sz="2800" dirty="0" smtClean="0"/>
-          </a:p>
-          <a:p>
-            <a:r>
-              <a:rPr lang="en-US" sz="2800" dirty="0" smtClean="0"/>
+            <a:endParaRPr lang="en-US" sz="2800" dirty="0"/>
+          </a:p>
+          <a:p>
+            <a:r>
+              <a:rPr lang="en-US" sz="2800" dirty="0"/>
               <a:t>Fixed evaluation of lambdas </a:t>
             </a:r>
           </a:p>
           <a:p>
             <a:pPr lvl="1"/>
             <a:r>
-              <a:rPr lang="en-US" sz="2400" dirty="0" smtClean="0"/>
+              <a:rPr lang="en-US" sz="2400" dirty="0"/>
               <a:t>Improperly treating all quoted text as SIMB</a:t>
             </a:r>
           </a:p>
@@ -4751,10 +4828,9 @@
           <a:lstStyle/>
           <a:p>
             <a:r>
-              <a:rPr lang="en-US" dirty="0" smtClean="0"/>
+              <a:rPr lang="en-US" dirty="0"/>
               <a:t>Swift Parser</a:t>
             </a:r>
-            <a:endParaRPr lang="en-US" dirty="0"/>
           </a:p>
         </p:txBody>
       </p:sp>
@@ -4771,7 +4847,7 @@
         <p:spPr/>
         <p:txBody>
           <a:bodyPr>
-            <a:normAutofit/>
+            <a:normAutofit fontScale="92500" lnSpcReduction="20000"/>
           </a:bodyPr>
           <a:lstStyle/>
           <a:p>
@@ -4779,44 +4855,44 @@
               <a:buNone/>
             </a:pPr>
             <a:r>
-              <a:rPr lang="en-US" sz="2400" dirty="0" smtClean="0"/>
+              <a:rPr lang="en-US" sz="2400" dirty="0"/>
               <a:t>Functionalities</a:t>
             </a:r>
           </a:p>
           <a:p>
             <a:pPr lvl="1"/>
             <a:r>
-              <a:rPr lang="en-US" sz="2400" dirty="0" smtClean="0"/>
+              <a:rPr lang="en-US" sz="2400" dirty="0"/>
               <a:t>Let</a:t>
             </a:r>
           </a:p>
           <a:p>
             <a:pPr lvl="2"/>
             <a:r>
-              <a:rPr lang="en-US" sz="2000" dirty="0" smtClean="0"/>
+              <a:rPr lang="en-US" sz="2000" dirty="0"/>
               <a:t>Declares a immutable variable</a:t>
             </a:r>
           </a:p>
           <a:p>
             <a:pPr lvl="2"/>
             <a:r>
-              <a:rPr lang="en-US" sz="2000" dirty="0" smtClean="0"/>
+              <a:rPr lang="en-US" sz="2000" dirty="0"/>
               <a:t>Validation errors when trying to change referenced variable</a:t>
             </a:r>
-            <a:endParaRPr lang="en-US" sz="2400" dirty="0" smtClean="0"/>
+            <a:endParaRPr lang="en-US" sz="2400" dirty="0"/>
           </a:p>
           <a:p>
             <a:pPr lvl="1"/>
             <a:r>
-              <a:rPr lang="en-US" sz="2400" dirty="0" err="1" smtClean="0"/>
+              <a:rPr lang="en-US" sz="2400" dirty="0" err="1"/>
               <a:t>Var</a:t>
             </a:r>
-            <a:endParaRPr lang="en-US" sz="2400" dirty="0" smtClean="0"/>
+            <a:endParaRPr lang="en-US" sz="2400" dirty="0"/>
           </a:p>
           <a:p>
             <a:pPr lvl="2"/>
             <a:r>
-              <a:rPr lang="en-US" sz="2000" dirty="0" smtClean="0"/>
+              <a:rPr lang="en-US" sz="2000" dirty="0"/>
               <a:t>Declares a mutable variable</a:t>
             </a:r>
           </a:p>
@@ -4829,15 +4905,56 @@
           <a:p>
             <a:pPr lvl="1"/>
             <a:r>
-              <a:rPr lang="en-US" sz="2400" dirty="0" smtClean="0"/>
+              <a:rPr lang="en-US" sz="2400" dirty="0"/>
               <a:t>Print</a:t>
             </a:r>
           </a:p>
           <a:p>
             <a:pPr lvl="2"/>
             <a:r>
-              <a:rPr lang="en-US" sz="2000" dirty="0" smtClean="0"/>
+              <a:rPr lang="en-US" sz="2000" dirty="0"/>
               <a:t>Prints anything within parenthesis, such as variables or any items</a:t>
+            </a:r>
+          </a:p>
+          <a:p>
+            <a:pPr marL="384048" lvl="2" indent="0">
+              <a:buNone/>
+            </a:pPr>
+            <a:endParaRPr lang="en-US" sz="2000" dirty="0"/>
+          </a:p>
+          <a:p>
+            <a:pPr marL="384048" lvl="2" indent="0">
+              <a:buNone/>
+            </a:pPr>
+            <a:r>
+              <a:rPr lang="en-US" sz="2000" dirty="0"/>
+              <a:t>Ex. let a = 3</a:t>
+            </a:r>
+          </a:p>
+          <a:p>
+            <a:pPr marL="384048" lvl="2" indent="0">
+              <a:buNone/>
+            </a:pPr>
+            <a:r>
+              <a:rPr lang="en-US" sz="2000" dirty="0"/>
+              <a:t>      </a:t>
+            </a:r>
+            <a:r>
+              <a:rPr lang="en-US" sz="2000" dirty="0" err="1"/>
+              <a:t>var</a:t>
+            </a:r>
+            <a:r>
+              <a:rPr lang="en-US" sz="2000" dirty="0"/>
+              <a:t> b = 4</a:t>
+            </a:r>
+          </a:p>
+          <a:p>
+            <a:pPr marL="384048" lvl="2" indent="0">
+              <a:buNone/>
+            </a:pPr>
+            <a:r>
+              <a:rPr lang="en-US" sz="2000" dirty="0"/>
+              <a:t>      print (a)</a:t>
             </a:r>
           </a:p>
           <a:p>
@@ -4846,7 +4963,7 @@
           </a:p>
           <a:p>
             <a:pPr lvl="1"/>
-            <a:endParaRPr lang="en-US" sz="2400" dirty="0" smtClean="0"/>
+            <a:endParaRPr lang="en-US" sz="2400" dirty="0"/>
           </a:p>
           <a:p>
             <a:pPr lvl="1"/>
@@ -4854,7 +4971,7 @@
           </a:p>
           <a:p>
             <a:pPr lvl="1"/>
-            <a:endParaRPr lang="en-US" sz="2400" dirty="0" smtClean="0"/>
+            <a:endParaRPr lang="en-US" sz="2400" dirty="0"/>
           </a:p>
         </p:txBody>
       </p:sp>

</xml_diff>